<commit_message>
Revision sent to Dr. Cruz 5/15
</commit_message>
<xml_diff>
--- a/microcolumn_paper/fig/figs.pptx
+++ b/microcolumn_paper/fig/figs.pptx
@@ -7,6 +7,8 @@
   <p:sldIdLst>
     <p:sldId id="256" r:id="rId2"/>
     <p:sldId id="285" r:id="rId3"/>
+    <p:sldId id="286" r:id="rId4"/>
+    <p:sldId id="287" r:id="rId5"/>
   </p:sldIdLst>
   <p:sldSz cx="12192000" cy="6858000"/>
   <p:notesSz cx="6858000" cy="9144000"/>
@@ -260,7 +262,7 @@
           <a:p>
             <a:fld id="{1B192184-33F6-4EB0-A3FF-9FE04D05D7E1}" type="datetimeFigureOut">
               <a:rPr lang="en-US" smtClean="0"/>
-              <a:t>5/5/2020</a:t>
+              <a:t>5/15/2020</a:t>
             </a:fld>
             <a:endParaRPr lang="en-US"/>
           </a:p>
@@ -458,7 +460,7 @@
           <a:p>
             <a:fld id="{1B192184-33F6-4EB0-A3FF-9FE04D05D7E1}" type="datetimeFigureOut">
               <a:rPr lang="en-US" smtClean="0"/>
-              <a:t>5/5/2020</a:t>
+              <a:t>5/15/2020</a:t>
             </a:fld>
             <a:endParaRPr lang="en-US"/>
           </a:p>
@@ -666,7 +668,7 @@
           <a:p>
             <a:fld id="{1B192184-33F6-4EB0-A3FF-9FE04D05D7E1}" type="datetimeFigureOut">
               <a:rPr lang="en-US" smtClean="0"/>
-              <a:t>5/5/2020</a:t>
+              <a:t>5/15/2020</a:t>
             </a:fld>
             <a:endParaRPr lang="en-US"/>
           </a:p>
@@ -864,7 +866,7 @@
           <a:p>
             <a:fld id="{1B192184-33F6-4EB0-A3FF-9FE04D05D7E1}" type="datetimeFigureOut">
               <a:rPr lang="en-US" smtClean="0"/>
-              <a:t>5/5/2020</a:t>
+              <a:t>5/15/2020</a:t>
             </a:fld>
             <a:endParaRPr lang="en-US"/>
           </a:p>
@@ -1139,7 +1141,7 @@
           <a:p>
             <a:fld id="{1B192184-33F6-4EB0-A3FF-9FE04D05D7E1}" type="datetimeFigureOut">
               <a:rPr lang="en-US" smtClean="0"/>
-              <a:t>5/5/2020</a:t>
+              <a:t>5/15/2020</a:t>
             </a:fld>
             <a:endParaRPr lang="en-US"/>
           </a:p>
@@ -1404,7 +1406,7 @@
           <a:p>
             <a:fld id="{1B192184-33F6-4EB0-A3FF-9FE04D05D7E1}" type="datetimeFigureOut">
               <a:rPr lang="en-US" smtClean="0"/>
-              <a:t>5/5/2020</a:t>
+              <a:t>5/15/2020</a:t>
             </a:fld>
             <a:endParaRPr lang="en-US"/>
           </a:p>
@@ -1816,7 +1818,7 @@
           <a:p>
             <a:fld id="{1B192184-33F6-4EB0-A3FF-9FE04D05D7E1}" type="datetimeFigureOut">
               <a:rPr lang="en-US" smtClean="0"/>
-              <a:t>5/5/2020</a:t>
+              <a:t>5/15/2020</a:t>
             </a:fld>
             <a:endParaRPr lang="en-US"/>
           </a:p>
@@ -1957,7 +1959,7 @@
           <a:p>
             <a:fld id="{1B192184-33F6-4EB0-A3FF-9FE04D05D7E1}" type="datetimeFigureOut">
               <a:rPr lang="en-US" smtClean="0"/>
-              <a:t>5/5/2020</a:t>
+              <a:t>5/15/2020</a:t>
             </a:fld>
             <a:endParaRPr lang="en-US"/>
           </a:p>
@@ -2070,7 +2072,7 @@
           <a:p>
             <a:fld id="{1B192184-33F6-4EB0-A3FF-9FE04D05D7E1}" type="datetimeFigureOut">
               <a:rPr lang="en-US" smtClean="0"/>
-              <a:t>5/5/2020</a:t>
+              <a:t>5/15/2020</a:t>
             </a:fld>
             <a:endParaRPr lang="en-US"/>
           </a:p>
@@ -2381,7 +2383,7 @@
           <a:p>
             <a:fld id="{1B192184-33F6-4EB0-A3FF-9FE04D05D7E1}" type="datetimeFigureOut">
               <a:rPr lang="en-US" smtClean="0"/>
-              <a:t>5/5/2020</a:t>
+              <a:t>5/15/2020</a:t>
             </a:fld>
             <a:endParaRPr lang="en-US"/>
           </a:p>
@@ -2669,7 +2671,7 @@
           <a:p>
             <a:fld id="{1B192184-33F6-4EB0-A3FF-9FE04D05D7E1}" type="datetimeFigureOut">
               <a:rPr lang="en-US" smtClean="0"/>
-              <a:t>5/5/2020</a:t>
+              <a:t>5/15/2020</a:t>
             </a:fld>
             <a:endParaRPr lang="en-US"/>
           </a:p>
@@ -2910,7 +2912,7 @@
           <a:p>
             <a:fld id="{1B192184-33F6-4EB0-A3FF-9FE04D05D7E1}" type="datetimeFigureOut">
               <a:rPr lang="en-US" smtClean="0"/>
-              <a:t>5/5/2020</a:t>
+              <a:t>5/15/2020</a:t>
             </a:fld>
             <a:endParaRPr lang="en-US"/>
           </a:p>
@@ -4535,6 +4537,448 @@
 </p:sld>
 </file>
 
+<file path=ppt/slides/slide3.xml><?xml version="1.0" encoding="utf-8"?>
+<p:sld xmlns:a="http://schemas.openxmlformats.org/drawingml/2006/main" xmlns:r="http://schemas.openxmlformats.org/officeDocument/2006/relationships" xmlns:p="http://schemas.openxmlformats.org/presentationml/2006/main">
+  <p:cSld>
+    <p:spTree>
+      <p:nvGrpSpPr>
+        <p:cNvPr id="1" name=""/>
+        <p:cNvGrpSpPr/>
+        <p:nvPr/>
+      </p:nvGrpSpPr>
+      <p:grpSpPr>
+        <a:xfrm>
+          <a:off x="0" y="0"/>
+          <a:ext cx="0" cy="0"/>
+          <a:chOff x="0" y="0"/>
+          <a:chExt cx="0" cy="0"/>
+        </a:xfrm>
+      </p:grpSpPr>
+      <p:grpSp>
+        <p:nvGrpSpPr>
+          <p:cNvPr id="18" name="Group 17">
+            <a:extLst>
+              <a:ext uri="{FF2B5EF4-FFF2-40B4-BE49-F238E27FC236}">
+                <a16:creationId xmlns:a16="http://schemas.microsoft.com/office/drawing/2014/main" id="{962BD9FC-294E-4082-B1BD-1A8D62545A77}"/>
+              </a:ext>
+            </a:extLst>
+          </p:cNvPr>
+          <p:cNvGrpSpPr/>
+          <p:nvPr/>
+        </p:nvGrpSpPr>
+        <p:grpSpPr>
+          <a:xfrm>
+            <a:off x="1268613" y="1886117"/>
+            <a:ext cx="8606907" cy="2892360"/>
+            <a:chOff x="1268613" y="1886117"/>
+            <a:chExt cx="8606907" cy="2892360"/>
+          </a:xfrm>
+        </p:grpSpPr>
+        <p:grpSp>
+          <p:nvGrpSpPr>
+            <p:cNvPr id="8" name="Group 7">
+              <a:extLst>
+                <a:ext uri="{FF2B5EF4-FFF2-40B4-BE49-F238E27FC236}">
+                  <a16:creationId xmlns:a16="http://schemas.microsoft.com/office/drawing/2014/main" id="{164A9BE8-ED66-4E60-A73D-CDB9DDFF20FE}"/>
+                </a:ext>
+              </a:extLst>
+            </p:cNvPr>
+            <p:cNvGrpSpPr/>
+            <p:nvPr/>
+          </p:nvGrpSpPr>
+          <p:grpSpPr>
+            <a:xfrm>
+              <a:off x="1268613" y="1886117"/>
+              <a:ext cx="8606907" cy="2892360"/>
+              <a:chOff x="1268613" y="1886117"/>
+              <a:chExt cx="8606907" cy="2892360"/>
+            </a:xfrm>
+          </p:grpSpPr>
+          <p:pic>
+            <p:nvPicPr>
+              <p:cNvPr id="3" name="Picture 2" descr="A close up of a logo&#10;&#10;Description automatically generated">
+                <a:extLst>
+                  <a:ext uri="{FF2B5EF4-FFF2-40B4-BE49-F238E27FC236}">
+                    <a16:creationId xmlns:a16="http://schemas.microsoft.com/office/drawing/2014/main" id="{4C1596F9-6AA0-4A1E-AD43-76C3985EA31F}"/>
+                  </a:ext>
+                </a:extLst>
+              </p:cNvPr>
+              <p:cNvPicPr>
+                <a:picLocks noChangeAspect="1"/>
+              </p:cNvPicPr>
+              <p:nvPr/>
+            </p:nvPicPr>
+            <p:blipFill rotWithShape="1">
+              <a:blip r:embed="rId2">
+                <a:extLst>
+                  <a:ext uri="{28A0092B-C50C-407E-A947-70E740481C1C}">
+                    <a14:useLocalDpi xmlns:a14="http://schemas.microsoft.com/office/drawing/2010/main" val="0"/>
+                  </a:ext>
+                </a:extLst>
+              </a:blip>
+              <a:srcRect t="57061" b="4803"/>
+              <a:stretch/>
+            </p:blipFill>
+            <p:spPr>
+              <a:xfrm>
+                <a:off x="1268613" y="1976551"/>
+                <a:ext cx="5178044" cy="2801926"/>
+              </a:xfrm>
+              <a:prstGeom prst="rect">
+                <a:avLst/>
+              </a:prstGeom>
+            </p:spPr>
+          </p:pic>
+          <p:pic>
+            <p:nvPicPr>
+              <p:cNvPr id="7" name="Picture 6" descr="A close up of a logo&#10;&#10;Description automatically generated">
+                <a:extLst>
+                  <a:ext uri="{FF2B5EF4-FFF2-40B4-BE49-F238E27FC236}">
+                    <a16:creationId xmlns:a16="http://schemas.microsoft.com/office/drawing/2014/main" id="{6459A6D0-6808-4E47-9623-E82459BFBE81}"/>
+                  </a:ext>
+                </a:extLst>
+              </p:cNvPr>
+              <p:cNvPicPr>
+                <a:picLocks noChangeAspect="1"/>
+              </p:cNvPicPr>
+              <p:nvPr/>
+            </p:nvPicPr>
+            <p:blipFill>
+              <a:blip r:embed="rId3">
+                <a:extLst>
+                  <a:ext uri="{28A0092B-C50C-407E-A947-70E740481C1C}">
+                    <a14:useLocalDpi xmlns:a14="http://schemas.microsoft.com/office/drawing/2010/main" val="0"/>
+                  </a:ext>
+                </a:extLst>
+              </a:blip>
+              <a:stretch>
+                <a:fillRect/>
+              </a:stretch>
+            </p:blipFill>
+            <p:spPr>
+              <a:xfrm>
+                <a:off x="6227126" y="1886117"/>
+                <a:ext cx="3648394" cy="2736296"/>
+              </a:xfrm>
+              <a:prstGeom prst="rect">
+                <a:avLst/>
+              </a:prstGeom>
+            </p:spPr>
+          </p:pic>
+        </p:grpSp>
+        <p:cxnSp>
+          <p:nvCxnSpPr>
+            <p:cNvPr id="10" name="Straight Connector 9">
+              <a:extLst>
+                <a:ext uri="{FF2B5EF4-FFF2-40B4-BE49-F238E27FC236}">
+                  <a16:creationId xmlns:a16="http://schemas.microsoft.com/office/drawing/2014/main" id="{B7C693A1-A908-4DDD-A2C6-97FB33AAB098}"/>
+                </a:ext>
+              </a:extLst>
+            </p:cNvPr>
+            <p:cNvCxnSpPr/>
+            <p:nvPr/>
+          </p:nvCxnSpPr>
+          <p:spPr>
+            <a:xfrm>
+              <a:off x="1905000" y="3337560"/>
+              <a:ext cx="4053840" cy="0"/>
+            </a:xfrm>
+            <a:prstGeom prst="line">
+              <a:avLst/>
+            </a:prstGeom>
+            <a:ln w="15875"/>
+          </p:spPr>
+          <p:style>
+            <a:lnRef idx="1">
+              <a:schemeClr val="accent1"/>
+            </a:lnRef>
+            <a:fillRef idx="0">
+              <a:schemeClr val="accent1"/>
+            </a:fillRef>
+            <a:effectRef idx="0">
+              <a:schemeClr val="accent1"/>
+            </a:effectRef>
+            <a:fontRef idx="minor">
+              <a:schemeClr val="tx1"/>
+            </a:fontRef>
+          </p:style>
+        </p:cxnSp>
+        <p:sp>
+          <p:nvSpPr>
+            <p:cNvPr id="11" name="TextBox 10">
+              <a:extLst>
+                <a:ext uri="{FF2B5EF4-FFF2-40B4-BE49-F238E27FC236}">
+                  <a16:creationId xmlns:a16="http://schemas.microsoft.com/office/drawing/2014/main" id="{3739A524-9F49-4339-A46A-2BA768661C0F}"/>
+                </a:ext>
+              </a:extLst>
+            </p:cNvPr>
+            <p:cNvSpPr txBox="1"/>
+            <p:nvPr/>
+          </p:nvSpPr>
+          <p:spPr>
+            <a:xfrm>
+              <a:off x="2941320" y="3100515"/>
+              <a:ext cx="1238352" cy="276999"/>
+            </a:xfrm>
+            <a:prstGeom prst="rect">
+              <a:avLst/>
+            </a:prstGeom>
+            <a:noFill/>
+          </p:spPr>
+          <p:txBody>
+            <a:bodyPr wrap="none" rtlCol="0">
+              <a:spAutoFit/>
+            </a:bodyPr>
+            <a:lstStyle/>
+            <a:p>
+              <a:r>
+                <a:rPr lang="en-US" sz="1200" dirty="0">
+                  <a:solidFill>
+                    <a:schemeClr val="accent1"/>
+                  </a:solidFill>
+                </a:rPr>
+                <a:t>Resting potential</a:t>
+              </a:r>
+            </a:p>
+          </p:txBody>
+        </p:sp>
+        <p:cxnSp>
+          <p:nvCxnSpPr>
+            <p:cNvPr id="13" name="Straight Arrow Connector 12">
+              <a:extLst>
+                <a:ext uri="{FF2B5EF4-FFF2-40B4-BE49-F238E27FC236}">
+                  <a16:creationId xmlns:a16="http://schemas.microsoft.com/office/drawing/2014/main" id="{6DEF82B6-9830-4D94-B00C-823F601655B2}"/>
+                </a:ext>
+              </a:extLst>
+            </p:cNvPr>
+            <p:cNvCxnSpPr/>
+            <p:nvPr/>
+          </p:nvCxnSpPr>
+          <p:spPr>
+            <a:xfrm>
+              <a:off x="4861560" y="3429000"/>
+              <a:ext cx="281940" cy="0"/>
+            </a:xfrm>
+            <a:prstGeom prst="straightConnector1">
+              <a:avLst/>
+            </a:prstGeom>
+            <a:ln>
+              <a:headEnd type="triangle"/>
+              <a:tailEnd type="triangle"/>
+            </a:ln>
+          </p:spPr>
+          <p:style>
+            <a:lnRef idx="1">
+              <a:schemeClr val="accent1"/>
+            </a:lnRef>
+            <a:fillRef idx="0">
+              <a:schemeClr val="accent1"/>
+            </a:fillRef>
+            <a:effectRef idx="0">
+              <a:schemeClr val="accent1"/>
+            </a:effectRef>
+            <a:fontRef idx="minor">
+              <a:schemeClr val="tx1"/>
+            </a:fontRef>
+          </p:style>
+        </p:cxnSp>
+        <p:sp>
+          <p:nvSpPr>
+            <p:cNvPr id="14" name="TextBox 13">
+              <a:extLst>
+                <a:ext uri="{FF2B5EF4-FFF2-40B4-BE49-F238E27FC236}">
+                  <a16:creationId xmlns:a16="http://schemas.microsoft.com/office/drawing/2014/main" id="{D3012050-1FE1-49CE-93BA-D75DD92DDECA}"/>
+                </a:ext>
+              </a:extLst>
+            </p:cNvPr>
+            <p:cNvSpPr txBox="1"/>
+            <p:nvPr/>
+          </p:nvSpPr>
+          <p:spPr>
+            <a:xfrm>
+              <a:off x="4566782" y="3381940"/>
+              <a:ext cx="1273234" cy="276999"/>
+            </a:xfrm>
+            <a:prstGeom prst="rect">
+              <a:avLst/>
+            </a:prstGeom>
+            <a:noFill/>
+          </p:spPr>
+          <p:txBody>
+            <a:bodyPr wrap="none" rtlCol="0">
+              <a:spAutoFit/>
+            </a:bodyPr>
+            <a:lstStyle/>
+            <a:p>
+              <a:r>
+                <a:rPr lang="en-US" sz="1200" dirty="0">
+                  <a:solidFill>
+                    <a:schemeClr val="accent1"/>
+                  </a:solidFill>
+                </a:rPr>
+                <a:t>Refractory period</a:t>
+              </a:r>
+            </a:p>
+          </p:txBody>
+        </p:sp>
+        <p:sp>
+          <p:nvSpPr>
+            <p:cNvPr id="15" name="TextBox 14">
+              <a:extLst>
+                <a:ext uri="{FF2B5EF4-FFF2-40B4-BE49-F238E27FC236}">
+                  <a16:creationId xmlns:a16="http://schemas.microsoft.com/office/drawing/2014/main" id="{BD6A1735-9844-4DA5-A506-40596E01CF09}"/>
+                </a:ext>
+              </a:extLst>
+            </p:cNvPr>
+            <p:cNvSpPr txBox="1"/>
+            <p:nvPr/>
+          </p:nvSpPr>
+          <p:spPr>
+            <a:xfrm>
+              <a:off x="4566782" y="2079522"/>
+              <a:ext cx="513154" cy="276999"/>
+            </a:xfrm>
+            <a:prstGeom prst="rect">
+              <a:avLst/>
+            </a:prstGeom>
+            <a:noFill/>
+          </p:spPr>
+          <p:txBody>
+            <a:bodyPr wrap="none" rtlCol="0">
+              <a:spAutoFit/>
+            </a:bodyPr>
+            <a:lstStyle/>
+            <a:p>
+              <a:r>
+                <a:rPr lang="en-US" sz="1200" dirty="0">
+                  <a:solidFill>
+                    <a:schemeClr val="accent1"/>
+                  </a:solidFill>
+                </a:rPr>
+                <a:t>Spike</a:t>
+              </a:r>
+            </a:p>
+          </p:txBody>
+        </p:sp>
+        <p:sp>
+          <p:nvSpPr>
+            <p:cNvPr id="17" name="TextBox 16">
+              <a:extLst>
+                <a:ext uri="{FF2B5EF4-FFF2-40B4-BE49-F238E27FC236}">
+                  <a16:creationId xmlns:a16="http://schemas.microsoft.com/office/drawing/2014/main" id="{F35FA994-FF8D-4621-A442-CD293E83F1F9}"/>
+                </a:ext>
+              </a:extLst>
+            </p:cNvPr>
+            <p:cNvSpPr txBox="1"/>
+            <p:nvPr/>
+          </p:nvSpPr>
+          <p:spPr>
+            <a:xfrm>
+              <a:off x="7089002" y="3839140"/>
+              <a:ext cx="1731821" cy="276999"/>
+            </a:xfrm>
+            <a:prstGeom prst="rect">
+              <a:avLst/>
+            </a:prstGeom>
+            <a:noFill/>
+          </p:spPr>
+          <p:txBody>
+            <a:bodyPr wrap="none" rtlCol="0">
+              <a:spAutoFit/>
+            </a:bodyPr>
+            <a:lstStyle/>
+            <a:p>
+              <a:r>
+                <a:rPr lang="en-US" sz="1200" dirty="0">
+                  <a:solidFill>
+                    <a:schemeClr val="accent2"/>
+                  </a:solidFill>
+                </a:rPr>
+                <a:t>Detection threshold 10%</a:t>
+              </a:r>
+            </a:p>
+          </p:txBody>
+        </p:sp>
+      </p:grpSp>
+    </p:spTree>
+    <p:extLst>
+      <p:ext uri="{BB962C8B-B14F-4D97-AF65-F5344CB8AC3E}">
+        <p14:creationId xmlns:p14="http://schemas.microsoft.com/office/powerpoint/2010/main" val="2329010038"/>
+      </p:ext>
+    </p:extLst>
+  </p:cSld>
+  <p:clrMapOvr>
+    <a:masterClrMapping/>
+  </p:clrMapOvr>
+</p:sld>
+</file>
+
+<file path=ppt/slides/slide4.xml><?xml version="1.0" encoding="utf-8"?>
+<p:sld xmlns:a="http://schemas.openxmlformats.org/drawingml/2006/main" xmlns:r="http://schemas.openxmlformats.org/officeDocument/2006/relationships" xmlns:p="http://schemas.openxmlformats.org/presentationml/2006/main">
+  <p:cSld>
+    <p:spTree>
+      <p:nvGrpSpPr>
+        <p:cNvPr id="1" name=""/>
+        <p:cNvGrpSpPr/>
+        <p:nvPr/>
+      </p:nvGrpSpPr>
+      <p:grpSpPr>
+        <a:xfrm>
+          <a:off x="0" y="0"/>
+          <a:ext cx="0" cy="0"/>
+          <a:chOff x="0" y="0"/>
+          <a:chExt cx="0" cy="0"/>
+        </a:xfrm>
+      </p:grpSpPr>
+      <p:pic>
+        <p:nvPicPr>
+          <p:cNvPr id="2" name="Picture 1" descr="A close up of a map&#10;&#10;Description automatically generated">
+            <a:extLst>
+              <a:ext uri="{FF2B5EF4-FFF2-40B4-BE49-F238E27FC236}">
+                <a16:creationId xmlns:a16="http://schemas.microsoft.com/office/drawing/2014/main" id="{E1183137-BDDE-4388-AF12-0551E72499D1}"/>
+              </a:ext>
+            </a:extLst>
+          </p:cNvPr>
+          <p:cNvPicPr>
+            <a:picLocks noChangeAspect="1"/>
+          </p:cNvPicPr>
+          <p:nvPr/>
+        </p:nvPicPr>
+        <p:blipFill>
+          <a:blip r:embed="rId2">
+            <a:extLst>
+              <a:ext uri="{28A0092B-C50C-407E-A947-70E740481C1C}">
+                <a14:useLocalDpi xmlns:a14="http://schemas.microsoft.com/office/drawing/2010/main" val="0"/>
+              </a:ext>
+            </a:extLst>
+          </a:blip>
+          <a:stretch>
+            <a:fillRect/>
+          </a:stretch>
+        </p:blipFill>
+        <p:spPr>
+          <a:xfrm>
+            <a:off x="5396594" y="1569492"/>
+            <a:ext cx="5703539" cy="3265385"/>
+          </a:xfrm>
+          <a:prstGeom prst="rect">
+            <a:avLst/>
+          </a:prstGeom>
+        </p:spPr>
+      </p:pic>
+    </p:spTree>
+    <p:extLst>
+      <p:ext uri="{BB962C8B-B14F-4D97-AF65-F5344CB8AC3E}">
+        <p14:creationId xmlns:p14="http://schemas.microsoft.com/office/powerpoint/2010/main" val="4174509952"/>
+      </p:ext>
+    </p:extLst>
+  </p:cSld>
+  <p:clrMapOvr>
+    <a:masterClrMapping/>
+  </p:clrMapOvr>
+</p:sld>
+</file>
+
 <file path=ppt/theme/theme1.xml><?xml version="1.0" encoding="utf-8"?>
 <a:theme xmlns:a="http://schemas.openxmlformats.org/drawingml/2006/main" name="Office Theme">
   <a:themeElements>

</xml_diff>

<commit_message>
Thesis advisory committee meeting 2020
</commit_message>
<xml_diff>
--- a/microcolumn_paper/fig/figs.pptx
+++ b/microcolumn_paper/fig/figs.pptx
@@ -262,7 +262,7 @@
           <a:p>
             <a:fld id="{1B192184-33F6-4EB0-A3FF-9FE04D05D7E1}" type="datetimeFigureOut">
               <a:rPr lang="en-US" smtClean="0"/>
-              <a:t>5/15/2020</a:t>
+              <a:t>6/7/2020</a:t>
             </a:fld>
             <a:endParaRPr lang="en-US"/>
           </a:p>
@@ -460,7 +460,7 @@
           <a:p>
             <a:fld id="{1B192184-33F6-4EB0-A3FF-9FE04D05D7E1}" type="datetimeFigureOut">
               <a:rPr lang="en-US" smtClean="0"/>
-              <a:t>5/15/2020</a:t>
+              <a:t>6/7/2020</a:t>
             </a:fld>
             <a:endParaRPr lang="en-US"/>
           </a:p>
@@ -668,7 +668,7 @@
           <a:p>
             <a:fld id="{1B192184-33F6-4EB0-A3FF-9FE04D05D7E1}" type="datetimeFigureOut">
               <a:rPr lang="en-US" smtClean="0"/>
-              <a:t>5/15/2020</a:t>
+              <a:t>6/7/2020</a:t>
             </a:fld>
             <a:endParaRPr lang="en-US"/>
           </a:p>
@@ -866,7 +866,7 @@
           <a:p>
             <a:fld id="{1B192184-33F6-4EB0-A3FF-9FE04D05D7E1}" type="datetimeFigureOut">
               <a:rPr lang="en-US" smtClean="0"/>
-              <a:t>5/15/2020</a:t>
+              <a:t>6/7/2020</a:t>
             </a:fld>
             <a:endParaRPr lang="en-US"/>
           </a:p>
@@ -1141,7 +1141,7 @@
           <a:p>
             <a:fld id="{1B192184-33F6-4EB0-A3FF-9FE04D05D7E1}" type="datetimeFigureOut">
               <a:rPr lang="en-US" smtClean="0"/>
-              <a:t>5/15/2020</a:t>
+              <a:t>6/7/2020</a:t>
             </a:fld>
             <a:endParaRPr lang="en-US"/>
           </a:p>
@@ -1406,7 +1406,7 @@
           <a:p>
             <a:fld id="{1B192184-33F6-4EB0-A3FF-9FE04D05D7E1}" type="datetimeFigureOut">
               <a:rPr lang="en-US" smtClean="0"/>
-              <a:t>5/15/2020</a:t>
+              <a:t>6/7/2020</a:t>
             </a:fld>
             <a:endParaRPr lang="en-US"/>
           </a:p>
@@ -1818,7 +1818,7 @@
           <a:p>
             <a:fld id="{1B192184-33F6-4EB0-A3FF-9FE04D05D7E1}" type="datetimeFigureOut">
               <a:rPr lang="en-US" smtClean="0"/>
-              <a:t>5/15/2020</a:t>
+              <a:t>6/7/2020</a:t>
             </a:fld>
             <a:endParaRPr lang="en-US"/>
           </a:p>
@@ -1959,7 +1959,7 @@
           <a:p>
             <a:fld id="{1B192184-33F6-4EB0-A3FF-9FE04D05D7E1}" type="datetimeFigureOut">
               <a:rPr lang="en-US" smtClean="0"/>
-              <a:t>5/15/2020</a:t>
+              <a:t>6/7/2020</a:t>
             </a:fld>
             <a:endParaRPr lang="en-US"/>
           </a:p>
@@ -2072,7 +2072,7 @@
           <a:p>
             <a:fld id="{1B192184-33F6-4EB0-A3FF-9FE04D05D7E1}" type="datetimeFigureOut">
               <a:rPr lang="en-US" smtClean="0"/>
-              <a:t>5/15/2020</a:t>
+              <a:t>6/7/2020</a:t>
             </a:fld>
             <a:endParaRPr lang="en-US"/>
           </a:p>
@@ -2383,7 +2383,7 @@
           <a:p>
             <a:fld id="{1B192184-33F6-4EB0-A3FF-9FE04D05D7E1}" type="datetimeFigureOut">
               <a:rPr lang="en-US" smtClean="0"/>
-              <a:t>5/15/2020</a:t>
+              <a:t>6/7/2020</a:t>
             </a:fld>
             <a:endParaRPr lang="en-US"/>
           </a:p>
@@ -2671,7 +2671,7 @@
           <a:p>
             <a:fld id="{1B192184-33F6-4EB0-A3FF-9FE04D05D7E1}" type="datetimeFigureOut">
               <a:rPr lang="en-US" smtClean="0"/>
-              <a:t>5/15/2020</a:t>
+              <a:t>6/7/2020</a:t>
             </a:fld>
             <a:endParaRPr lang="en-US"/>
           </a:p>
@@ -2912,7 +2912,7 @@
           <a:p>
             <a:fld id="{1B192184-33F6-4EB0-A3FF-9FE04D05D7E1}" type="datetimeFigureOut">
               <a:rPr lang="en-US" smtClean="0"/>
-              <a:t>5/15/2020</a:t>
+              <a:t>6/7/2020</a:t>
             </a:fld>
             <a:endParaRPr lang="en-US"/>
           </a:p>
@@ -3329,132 +3329,111 @@
           <a:chExt cx="0" cy="0"/>
         </a:xfrm>
       </p:grpSpPr>
-      <p:grpSp>
-        <p:nvGrpSpPr>
-          <p:cNvPr id="10" name="Group 9">
-            <a:extLst>
-              <a:ext uri="{FF2B5EF4-FFF2-40B4-BE49-F238E27FC236}">
-                <a16:creationId xmlns:a16="http://schemas.microsoft.com/office/drawing/2014/main" id="{39299476-C1D3-4CC3-BF4C-5098B55FD179}"/>
-              </a:ext>
-            </a:extLst>
-          </p:cNvPr>
-          <p:cNvGrpSpPr/>
+      <p:pic>
+        <p:nvPicPr>
+          <p:cNvPr id="9" name="Picture 8" descr="A picture containing light, bird, group&#10;&#10;Description automatically generated">
+            <a:extLst>
+              <a:ext uri="{FF2B5EF4-FFF2-40B4-BE49-F238E27FC236}">
+                <a16:creationId xmlns:a16="http://schemas.microsoft.com/office/drawing/2014/main" id="{A0430B3E-4F96-451E-85D7-1787DDF40D91}"/>
+              </a:ext>
+            </a:extLst>
+          </p:cNvPr>
+          <p:cNvPicPr>
+            <a:picLocks noChangeAspect="1"/>
+          </p:cNvPicPr>
           <p:nvPr/>
-        </p:nvGrpSpPr>
-        <p:grpSpPr>
+        </p:nvPicPr>
+        <p:blipFill rotWithShape="1">
+          <a:blip r:embed="rId2">
+            <a:extLst>
+              <a:ext uri="{28A0092B-C50C-407E-A947-70E740481C1C}">
+                <a14:useLocalDpi xmlns:a14="http://schemas.microsoft.com/office/drawing/2010/main" val="0"/>
+              </a:ext>
+            </a:extLst>
+          </a:blip>
+          <a:srcRect l="24630" t="3374" r="22470" b="7114"/>
+          <a:stretch/>
+        </p:blipFill>
+        <p:spPr>
+          <a:xfrm>
+            <a:off x="7781877" y="1294266"/>
+            <a:ext cx="3087150" cy="3973980"/>
+          </a:xfrm>
+          <a:prstGeom prst="rect">
+            <a:avLst/>
+          </a:prstGeom>
+        </p:spPr>
+      </p:pic>
+      <p:pic>
+        <p:nvPicPr>
+          <p:cNvPr id="5" name="Picture 4" descr="A picture containing light, bird, group, traffic&#10;&#10;Description automatically generated">
+            <a:extLst>
+              <a:ext uri="{FF2B5EF4-FFF2-40B4-BE49-F238E27FC236}">
+                <a16:creationId xmlns:a16="http://schemas.microsoft.com/office/drawing/2014/main" id="{742D8F00-76D5-41CB-A1A4-ABCA672FE72A}"/>
+              </a:ext>
+            </a:extLst>
+          </p:cNvPr>
+          <p:cNvPicPr>
+            <a:picLocks noChangeAspect="1"/>
+          </p:cNvPicPr>
+          <p:nvPr/>
+        </p:nvPicPr>
+        <p:blipFill rotWithShape="1">
+          <a:blip r:embed="rId3">
+            <a:extLst>
+              <a:ext uri="{28A0092B-C50C-407E-A947-70E740481C1C}">
+                <a14:useLocalDpi xmlns:a14="http://schemas.microsoft.com/office/drawing/2010/main" val="0"/>
+              </a:ext>
+            </a:extLst>
+          </a:blip>
+          <a:srcRect l="25534" t="3374" r="21565" b="7114"/>
+          <a:stretch/>
+        </p:blipFill>
+        <p:spPr>
           <a:xfrm>
             <a:off x="1464966" y="1294266"/>
-            <a:ext cx="9404061" cy="3973980"/>
-            <a:chOff x="499291" y="1525003"/>
-            <a:chExt cx="9404061" cy="3973980"/>
+            <a:ext cx="3087149" cy="3973980"/>
           </a:xfrm>
-        </p:grpSpPr>
-        <p:pic>
-          <p:nvPicPr>
-            <p:cNvPr id="9" name="Picture 8" descr="A picture containing light, bird, group&#10;&#10;Description automatically generated">
-              <a:extLst>
-                <a:ext uri="{FF2B5EF4-FFF2-40B4-BE49-F238E27FC236}">
-                  <a16:creationId xmlns:a16="http://schemas.microsoft.com/office/drawing/2014/main" id="{A0430B3E-4F96-451E-85D7-1787DDF40D91}"/>
-                </a:ext>
-              </a:extLst>
-            </p:cNvPr>
-            <p:cNvPicPr>
-              <a:picLocks noChangeAspect="1"/>
-            </p:cNvPicPr>
-            <p:nvPr/>
-          </p:nvPicPr>
-          <p:blipFill rotWithShape="1">
-            <a:blip r:embed="rId2">
-              <a:extLst>
-                <a:ext uri="{28A0092B-C50C-407E-A947-70E740481C1C}">
-                  <a14:useLocalDpi xmlns:a14="http://schemas.microsoft.com/office/drawing/2010/main" val="0"/>
-                </a:ext>
-              </a:extLst>
-            </a:blip>
-            <a:srcRect l="24630" t="3374" r="22470" b="7114"/>
-            <a:stretch/>
-          </p:blipFill>
-          <p:spPr>
-            <a:xfrm>
-              <a:off x="6816202" y="1525003"/>
-              <a:ext cx="3087150" cy="3973980"/>
-            </a:xfrm>
-            <a:prstGeom prst="rect">
-              <a:avLst/>
-            </a:prstGeom>
-          </p:spPr>
-        </p:pic>
-        <p:pic>
-          <p:nvPicPr>
-            <p:cNvPr id="5" name="Picture 4" descr="A picture containing light, bird, group, traffic&#10;&#10;Description automatically generated">
-              <a:extLst>
-                <a:ext uri="{FF2B5EF4-FFF2-40B4-BE49-F238E27FC236}">
-                  <a16:creationId xmlns:a16="http://schemas.microsoft.com/office/drawing/2014/main" id="{742D8F00-76D5-41CB-A1A4-ABCA672FE72A}"/>
-                </a:ext>
-              </a:extLst>
-            </p:cNvPr>
-            <p:cNvPicPr>
-              <a:picLocks noChangeAspect="1"/>
-            </p:cNvPicPr>
-            <p:nvPr/>
-          </p:nvPicPr>
-          <p:blipFill rotWithShape="1">
-            <a:blip r:embed="rId3">
-              <a:extLst>
-                <a:ext uri="{28A0092B-C50C-407E-A947-70E740481C1C}">
-                  <a14:useLocalDpi xmlns:a14="http://schemas.microsoft.com/office/drawing/2010/main" val="0"/>
-                </a:ext>
-              </a:extLst>
-            </a:blip>
-            <a:srcRect l="25534" t="3374" r="21565" b="7114"/>
-            <a:stretch/>
-          </p:blipFill>
-          <p:spPr>
-            <a:xfrm>
-              <a:off x="499291" y="1525003"/>
-              <a:ext cx="3087149" cy="3973980"/>
-            </a:xfrm>
-            <a:prstGeom prst="rect">
-              <a:avLst/>
-            </a:prstGeom>
-          </p:spPr>
-        </p:pic>
-        <p:pic>
-          <p:nvPicPr>
-            <p:cNvPr id="7" name="Picture 6" descr="A picture containing group&#10;&#10;Description automatically generated">
-              <a:extLst>
-                <a:ext uri="{FF2B5EF4-FFF2-40B4-BE49-F238E27FC236}">
-                  <a16:creationId xmlns:a16="http://schemas.microsoft.com/office/drawing/2014/main" id="{34211126-BC65-44E8-912C-8FAA0514F589}"/>
-                </a:ext>
-              </a:extLst>
-            </p:cNvPr>
-            <p:cNvPicPr>
-              <a:picLocks noChangeAspect="1"/>
-            </p:cNvPicPr>
-            <p:nvPr/>
-          </p:nvPicPr>
-          <p:blipFill rotWithShape="1">
-            <a:blip r:embed="rId4">
-              <a:extLst>
-                <a:ext uri="{28A0092B-C50C-407E-A947-70E740481C1C}">
-                  <a14:useLocalDpi xmlns:a14="http://schemas.microsoft.com/office/drawing/2010/main" val="0"/>
-                </a:ext>
-              </a:extLst>
-            </a:blip>
-            <a:srcRect l="25391" t="3361" r="21708" b="7127"/>
-            <a:stretch/>
-          </p:blipFill>
-          <p:spPr>
-            <a:xfrm>
-              <a:off x="3661941" y="1525003"/>
-              <a:ext cx="3087150" cy="3973980"/>
-            </a:xfrm>
-            <a:prstGeom prst="rect">
-              <a:avLst/>
-            </a:prstGeom>
-          </p:spPr>
-        </p:pic>
-      </p:grpSp>
+          <a:prstGeom prst="rect">
+            <a:avLst/>
+          </a:prstGeom>
+        </p:spPr>
+      </p:pic>
+      <p:pic>
+        <p:nvPicPr>
+          <p:cNvPr id="7" name="Picture 6" descr="A picture containing group&#10;&#10;Description automatically generated">
+            <a:extLst>
+              <a:ext uri="{FF2B5EF4-FFF2-40B4-BE49-F238E27FC236}">
+                <a16:creationId xmlns:a16="http://schemas.microsoft.com/office/drawing/2014/main" id="{34211126-BC65-44E8-912C-8FAA0514F589}"/>
+              </a:ext>
+            </a:extLst>
+          </p:cNvPr>
+          <p:cNvPicPr>
+            <a:picLocks noChangeAspect="1"/>
+          </p:cNvPicPr>
+          <p:nvPr/>
+        </p:nvPicPr>
+        <p:blipFill rotWithShape="1">
+          <a:blip r:embed="rId4">
+            <a:extLst>
+              <a:ext uri="{28A0092B-C50C-407E-A947-70E740481C1C}">
+                <a14:useLocalDpi xmlns:a14="http://schemas.microsoft.com/office/drawing/2010/main" val="0"/>
+              </a:ext>
+            </a:extLst>
+          </a:blip>
+          <a:srcRect l="25391" t="3361" r="21708" b="7127"/>
+          <a:stretch/>
+        </p:blipFill>
+        <p:spPr>
+          <a:xfrm>
+            <a:off x="4627616" y="1294266"/>
+            <a:ext cx="3087150" cy="3973980"/>
+          </a:xfrm>
+          <a:prstGeom prst="rect">
+            <a:avLst/>
+          </a:prstGeom>
+        </p:spPr>
+      </p:pic>
     </p:spTree>
     <p:extLst>
       <p:ext uri="{BB962C8B-B14F-4D97-AF65-F5344CB8AC3E}">

</xml_diff>